<commit_message>
metrics draft done - queries & scripts tbd
</commit_message>
<xml_diff>
--- a/20230509_draftreview.pptx
+++ b/20230509_draftreview.pptx
@@ -22,6 +22,9 @@
     <p:sldId id="272" r:id="rId16"/>
     <p:sldId id="273" r:id="rId17"/>
     <p:sldId id="274" r:id="rId18"/>
+    <p:sldId id="275" r:id="rId19"/>
+    <p:sldId id="276" r:id="rId20"/>
+    <p:sldId id="277" r:id="rId21"/>
   </p:sldIdLst>
   <p:sldSz cx="12192000" cy="6858000"/>
   <p:notesSz cx="6858000" cy="9144000"/>
@@ -275,7 +278,7 @@
           <a:p>
             <a:fld id="{334B9968-23A4-463E-899F-3BA3AC149E28}" type="datetimeFigureOut">
               <a:rPr lang="en-US" smtClean="0"/>
-              <a:t>5/10/2023</a:t>
+              <a:t>5/12/2023</a:t>
             </a:fld>
             <a:endParaRPr lang="en-US"/>
           </a:p>
@@ -473,7 +476,7 @@
           <a:p>
             <a:fld id="{334B9968-23A4-463E-899F-3BA3AC149E28}" type="datetimeFigureOut">
               <a:rPr lang="en-US" smtClean="0"/>
-              <a:t>5/10/2023</a:t>
+              <a:t>5/12/2023</a:t>
             </a:fld>
             <a:endParaRPr lang="en-US"/>
           </a:p>
@@ -681,7 +684,7 @@
           <a:p>
             <a:fld id="{334B9968-23A4-463E-899F-3BA3AC149E28}" type="datetimeFigureOut">
               <a:rPr lang="en-US" smtClean="0"/>
-              <a:t>5/10/2023</a:t>
+              <a:t>5/12/2023</a:t>
             </a:fld>
             <a:endParaRPr lang="en-US"/>
           </a:p>
@@ -879,7 +882,7 @@
           <a:p>
             <a:fld id="{334B9968-23A4-463E-899F-3BA3AC149E28}" type="datetimeFigureOut">
               <a:rPr lang="en-US" smtClean="0"/>
-              <a:t>5/10/2023</a:t>
+              <a:t>5/12/2023</a:t>
             </a:fld>
             <a:endParaRPr lang="en-US"/>
           </a:p>
@@ -1154,7 +1157,7 @@
           <a:p>
             <a:fld id="{334B9968-23A4-463E-899F-3BA3AC149E28}" type="datetimeFigureOut">
               <a:rPr lang="en-US" smtClean="0"/>
-              <a:t>5/10/2023</a:t>
+              <a:t>5/12/2023</a:t>
             </a:fld>
             <a:endParaRPr lang="en-US"/>
           </a:p>
@@ -1419,7 +1422,7 @@
           <a:p>
             <a:fld id="{334B9968-23A4-463E-899F-3BA3AC149E28}" type="datetimeFigureOut">
               <a:rPr lang="en-US" smtClean="0"/>
-              <a:t>5/10/2023</a:t>
+              <a:t>5/12/2023</a:t>
             </a:fld>
             <a:endParaRPr lang="en-US"/>
           </a:p>
@@ -1831,7 +1834,7 @@
           <a:p>
             <a:fld id="{334B9968-23A4-463E-899F-3BA3AC149E28}" type="datetimeFigureOut">
               <a:rPr lang="en-US" smtClean="0"/>
-              <a:t>5/10/2023</a:t>
+              <a:t>5/12/2023</a:t>
             </a:fld>
             <a:endParaRPr lang="en-US"/>
           </a:p>
@@ -1972,7 +1975,7 @@
           <a:p>
             <a:fld id="{334B9968-23A4-463E-899F-3BA3AC149E28}" type="datetimeFigureOut">
               <a:rPr lang="en-US" smtClean="0"/>
-              <a:t>5/10/2023</a:t>
+              <a:t>5/12/2023</a:t>
             </a:fld>
             <a:endParaRPr lang="en-US"/>
           </a:p>
@@ -2085,7 +2088,7 @@
           <a:p>
             <a:fld id="{334B9968-23A4-463E-899F-3BA3AC149E28}" type="datetimeFigureOut">
               <a:rPr lang="en-US" smtClean="0"/>
-              <a:t>5/10/2023</a:t>
+              <a:t>5/12/2023</a:t>
             </a:fld>
             <a:endParaRPr lang="en-US"/>
           </a:p>
@@ -2396,7 +2399,7 @@
           <a:p>
             <a:fld id="{334B9968-23A4-463E-899F-3BA3AC149E28}" type="datetimeFigureOut">
               <a:rPr lang="en-US" smtClean="0"/>
-              <a:t>5/10/2023</a:t>
+              <a:t>5/12/2023</a:t>
             </a:fld>
             <a:endParaRPr lang="en-US"/>
           </a:p>
@@ -2684,7 +2687,7 @@
           <a:p>
             <a:fld id="{334B9968-23A4-463E-899F-3BA3AC149E28}" type="datetimeFigureOut">
               <a:rPr lang="en-US" smtClean="0"/>
-              <a:t>5/10/2023</a:t>
+              <a:t>5/12/2023</a:t>
             </a:fld>
             <a:endParaRPr lang="en-US"/>
           </a:p>
@@ -2925,7 +2928,7 @@
           <a:p>
             <a:fld id="{334B9968-23A4-463E-899F-3BA3AC149E28}" type="datetimeFigureOut">
               <a:rPr lang="en-US" smtClean="0"/>
-              <a:t>5/10/2023</a:t>
+              <a:t>5/12/2023</a:t>
             </a:fld>
             <a:endParaRPr lang="en-US"/>
           </a:p>
@@ -3453,7 +3456,15 @@
           <a:p>
             <a:r>
               <a:rPr lang="en-US" dirty="0"/>
-              <a:t>Example “Complex” Validator at Epoch 431</a:t>
+              <a:t>Example “Complex” </a:t>
+            </a:r>
+            <a:r>
+              <a:rPr lang="en-US" dirty="0" err="1"/>
+              <a:t>Staker</a:t>
+            </a:r>
+            <a:r>
+              <a:rPr lang="en-US" dirty="0"/>
+              <a:t> at Epoch 431</a:t>
             </a:r>
           </a:p>
         </p:txBody>
@@ -3737,7 +3748,7 @@
                 </a:solidFill>
                 <a:latin typeface="Inter"/>
               </a:rPr>
-              <a:t>Q for Sol Experts: can we identify if de-activated 396? No cooldown?</a:t>
+              <a:t>Q- can we identify if de-activated 396? No cooldown?</a:t>
             </a:r>
           </a:p>
           <a:p>
@@ -3847,8 +3858,13 @@
           <a:p>
             <a:r>
               <a:rPr lang="en-US" dirty="0"/>
-              <a:t>Example “Complex” Validator</a:t>
-            </a:r>
+              <a:t>Example “Complex” </a:t>
+            </a:r>
+            <a:r>
+              <a:rPr lang="en-US" dirty="0" err="1"/>
+              <a:t>Staker</a:t>
+            </a:r>
+            <a:endParaRPr lang="en-US" dirty="0"/>
           </a:p>
         </p:txBody>
       </p:sp>
@@ -3894,7 +3910,7 @@
                   <a:srgbClr val="0070C0"/>
                 </a:solidFill>
               </a:rPr>
-              <a:t>Q for Sol experts – this </a:t>
+              <a:t>Q– this </a:t>
             </a:r>
             <a:r>
               <a:rPr lang="en-US" sz="2000" dirty="0" err="1">
@@ -4047,8 +4063,13 @@
           <a:p>
             <a:r>
               <a:rPr lang="en-US" dirty="0"/>
-              <a:t>Example “Complex” Validator</a:t>
-            </a:r>
+              <a:t>Example “Complex” </a:t>
+            </a:r>
+            <a:r>
+              <a:rPr lang="en-US" dirty="0" err="1"/>
+              <a:t>Staker</a:t>
+            </a:r>
+            <a:endParaRPr lang="en-US" dirty="0"/>
           </a:p>
         </p:txBody>
       </p:sp>
@@ -5820,6 +5841,558 @@
 </p:sld>
 </file>
 
+<file path=ppt/slides/slide18.xml><?xml version="1.0" encoding="utf-8"?>
+<p:sld xmlns:a="http://schemas.openxmlformats.org/drawingml/2006/main" xmlns:r="http://schemas.openxmlformats.org/officeDocument/2006/relationships" xmlns:p="http://schemas.openxmlformats.org/presentationml/2006/main">
+  <p:cSld>
+    <p:spTree>
+      <p:nvGrpSpPr>
+        <p:cNvPr id="1" name=""/>
+        <p:cNvGrpSpPr/>
+        <p:nvPr/>
+      </p:nvGrpSpPr>
+      <p:grpSpPr>
+        <a:xfrm>
+          <a:off x="0" y="0"/>
+          <a:ext cx="0" cy="0"/>
+          <a:chOff x="0" y="0"/>
+          <a:chExt cx="0" cy="0"/>
+        </a:xfrm>
+      </p:grpSpPr>
+      <p:sp>
+        <p:nvSpPr>
+          <p:cNvPr id="2" name="Title 1">
+            <a:extLst>
+              <a:ext uri="{FF2B5EF4-FFF2-40B4-BE49-F238E27FC236}">
+                <a16:creationId xmlns:a16="http://schemas.microsoft.com/office/drawing/2014/main" id="{007695A3-F158-94CE-1E2C-EC83F044C93F}"/>
+              </a:ext>
+            </a:extLst>
+          </p:cNvPr>
+          <p:cNvSpPr>
+            <a:spLocks noGrp="1"/>
+          </p:cNvSpPr>
+          <p:nvPr>
+            <p:ph type="title"/>
+          </p:nvPr>
+        </p:nvSpPr>
+        <p:spPr/>
+        <p:txBody>
+          <a:bodyPr/>
+          <a:lstStyle/>
+          <a:p>
+            <a:r>
+              <a:rPr lang="en-US" dirty="0"/>
+              <a:t>Available Tables</a:t>
+            </a:r>
+          </a:p>
+        </p:txBody>
+      </p:sp>
+      <p:graphicFrame>
+        <p:nvGraphicFramePr>
+          <p:cNvPr id="4" name="Table 2">
+            <a:extLst>
+              <a:ext uri="{FF2B5EF4-FFF2-40B4-BE49-F238E27FC236}">
+                <a16:creationId xmlns:a16="http://schemas.microsoft.com/office/drawing/2014/main" id="{1A99C517-E90B-1837-1BEA-E6A38B84F22C}"/>
+              </a:ext>
+            </a:extLst>
+          </p:cNvPr>
+          <p:cNvGraphicFramePr>
+            <a:graphicFrameLocks noGrp="1"/>
+          </p:cNvGraphicFramePr>
+          <p:nvPr>
+            <p:ph idx="1"/>
+            <p:extLst>
+              <p:ext uri="{D42A27DB-BD31-4B8C-83A1-F6EECF244321}">
+                <p14:modId xmlns:p14="http://schemas.microsoft.com/office/powerpoint/2010/main" val="2767374398"/>
+              </p:ext>
+            </p:extLst>
+          </p:nvPr>
+        </p:nvGraphicFramePr>
+        <p:xfrm>
+          <a:off x="838200" y="1825625"/>
+          <a:ext cx="10515600" cy="2595880"/>
+        </p:xfrm>
+        <a:graphic>
+          <a:graphicData uri="http://schemas.openxmlformats.org/drawingml/2006/table">
+            <a:tbl>
+              <a:tblPr firstRow="1" bandRow="1">
+                <a:tableStyleId>{5C22544A-7EE6-4342-B048-85BDC9FD1C3A}</a:tableStyleId>
+              </a:tblPr>
+              <a:tblGrid>
+                <a:gridCol w="1949605">
+                  <a:extLst>
+                    <a:ext uri="{9D8B030D-6E8A-4147-A177-3AD203B41FA5}">
+                      <a16:colId xmlns:a16="http://schemas.microsoft.com/office/drawing/2014/main" val="346462182"/>
+                    </a:ext>
+                  </a:extLst>
+                </a:gridCol>
+                <a:gridCol w="2096429">
+                  <a:extLst>
+                    <a:ext uri="{9D8B030D-6E8A-4147-A177-3AD203B41FA5}">
+                      <a16:colId xmlns:a16="http://schemas.microsoft.com/office/drawing/2014/main" val="456057825"/>
+                    </a:ext>
+                  </a:extLst>
+                </a:gridCol>
+                <a:gridCol w="6469566">
+                  <a:extLst>
+                    <a:ext uri="{9D8B030D-6E8A-4147-A177-3AD203B41FA5}">
+                      <a16:colId xmlns:a16="http://schemas.microsoft.com/office/drawing/2014/main" val="2549859990"/>
+                    </a:ext>
+                  </a:extLst>
+                </a:gridCol>
+              </a:tblGrid>
+              <a:tr h="370840">
+                <a:tc>
+                  <a:txBody>
+                    <a:bodyPr/>
+                    <a:lstStyle/>
+                    <a:p>
+                      <a:r>
+                        <a:rPr lang="en-US" dirty="0"/>
+                        <a:t>Historical</a:t>
+                      </a:r>
+                    </a:p>
+                  </a:txBody>
+                  <a:tcPr/>
+                </a:tc>
+                <a:tc>
+                  <a:txBody>
+                    <a:bodyPr/>
+                    <a:lstStyle/>
+                    <a:p>
+                      <a:r>
+                        <a:rPr lang="en-US" dirty="0"/>
+                        <a:t>Snapshot</a:t>
+                      </a:r>
+                    </a:p>
+                  </a:txBody>
+                  <a:tcPr/>
+                </a:tc>
+                <a:tc>
+                  <a:txBody>
+                    <a:bodyPr/>
+                    <a:lstStyle/>
+                    <a:p>
+                      <a:r>
+                        <a:rPr lang="en-US" dirty="0"/>
+                        <a:t>Explainer</a:t>
+                      </a:r>
+                    </a:p>
+                  </a:txBody>
+                  <a:tcPr/>
+                </a:tc>
+                <a:extLst>
+                  <a:ext uri="{0D108BD9-81ED-4DB2-BD59-A6C34878D82A}">
+                    <a16:rowId xmlns:a16="http://schemas.microsoft.com/office/drawing/2014/main" val="3051260317"/>
+                  </a:ext>
+                </a:extLst>
+              </a:tr>
+              <a:tr h="370840">
+                <a:tc>
+                  <a:txBody>
+                    <a:bodyPr/>
+                    <a:lstStyle/>
+                    <a:p>
+                      <a:r>
+                        <a:rPr lang="en-US" dirty="0"/>
+                        <a:t>Stake Account</a:t>
+                      </a:r>
+                    </a:p>
+                  </a:txBody>
+                  <a:tcPr/>
+                </a:tc>
+                <a:tc>
+                  <a:txBody>
+                    <a:bodyPr/>
+                    <a:lstStyle/>
+                    <a:p>
+                      <a:r>
+                        <a:rPr lang="en-US" dirty="0"/>
+                        <a:t>Stake Accounts</a:t>
+                      </a:r>
+                    </a:p>
+                  </a:txBody>
+                  <a:tcPr/>
+                </a:tc>
+                <a:tc rowSpan="2">
+                  <a:txBody>
+                    <a:bodyPr/>
+                    <a:lstStyle/>
+                    <a:p>
+                      <a:r>
+                        <a:rPr lang="en-US" dirty="0"/>
+                        <a:t>For each Epoch, a Stake Public Key (validator) has an Active Stake (and Active SOL) balances, that change while active and delegated.</a:t>
+                      </a:r>
+                    </a:p>
+                  </a:txBody>
+                  <a:tcPr/>
+                </a:tc>
+                <a:extLst>
+                  <a:ext uri="{0D108BD9-81ED-4DB2-BD59-A6C34878D82A}">
+                    <a16:rowId xmlns:a16="http://schemas.microsoft.com/office/drawing/2014/main" val="1367634304"/>
+                  </a:ext>
+                </a:extLst>
+              </a:tr>
+              <a:tr h="370840">
+                <a:tc>
+                  <a:txBody>
+                    <a:bodyPr/>
+                    <a:lstStyle/>
+                    <a:p>
+                      <a:endParaRPr lang="en-US" dirty="0"/>
+                    </a:p>
+                  </a:txBody>
+                  <a:tcPr/>
+                </a:tc>
+                <a:tc>
+                  <a:txBody>
+                    <a:bodyPr/>
+                    <a:lstStyle/>
+                    <a:p>
+                      <a:endParaRPr lang="en-US" dirty="0"/>
+                    </a:p>
+                  </a:txBody>
+                  <a:tcPr/>
+                </a:tc>
+                <a:tc vMerge="1">
+                  <a:txBody>
+                    <a:bodyPr/>
+                    <a:lstStyle/>
+                    <a:p>
+                      <a:endParaRPr lang="en-US" dirty="0"/>
+                    </a:p>
+                  </a:txBody>
+                  <a:tcPr/>
+                </a:tc>
+                <a:extLst>
+                  <a:ext uri="{0D108BD9-81ED-4DB2-BD59-A6C34878D82A}">
+                    <a16:rowId xmlns:a16="http://schemas.microsoft.com/office/drawing/2014/main" val="2673547266"/>
+                  </a:ext>
+                </a:extLst>
+              </a:tr>
+              <a:tr h="370840">
+                <a:tc>
+                  <a:txBody>
+                    <a:bodyPr/>
+                    <a:lstStyle/>
+                    <a:p>
+                      <a:r>
+                        <a:rPr lang="en-US" dirty="0"/>
+                        <a:t>Vote Account</a:t>
+                      </a:r>
+                    </a:p>
+                  </a:txBody>
+                  <a:tcPr/>
+                </a:tc>
+                <a:tc>
+                  <a:txBody>
+                    <a:bodyPr/>
+                    <a:lstStyle/>
+                    <a:p>
+                      <a:r>
+                        <a:rPr lang="en-US" dirty="0"/>
+                        <a:t>Vote Accounts</a:t>
+                      </a:r>
+                    </a:p>
+                  </a:txBody>
+                  <a:tcPr/>
+                </a:tc>
+                <a:tc rowSpan="2">
+                  <a:txBody>
+                    <a:bodyPr/>
+                    <a:lstStyle/>
+                    <a:p>
+                      <a:r>
+                        <a:rPr lang="en-US" dirty="0"/>
+                        <a:t>A stake account VOTE_PUBKEY aligns with PUBKEY voting activity.</a:t>
+                      </a:r>
+                    </a:p>
+                  </a:txBody>
+                  <a:tcPr/>
+                </a:tc>
+                <a:extLst>
+                  <a:ext uri="{0D108BD9-81ED-4DB2-BD59-A6C34878D82A}">
+                    <a16:rowId xmlns:a16="http://schemas.microsoft.com/office/drawing/2014/main" val="1374414471"/>
+                  </a:ext>
+                </a:extLst>
+              </a:tr>
+              <a:tr h="370840">
+                <a:tc>
+                  <a:txBody>
+                    <a:bodyPr/>
+                    <a:lstStyle/>
+                    <a:p>
+                      <a:endParaRPr lang="en-US" dirty="0"/>
+                    </a:p>
+                  </a:txBody>
+                  <a:tcPr/>
+                </a:tc>
+                <a:tc>
+                  <a:txBody>
+                    <a:bodyPr/>
+                    <a:lstStyle/>
+                    <a:p>
+                      <a:endParaRPr lang="en-US" dirty="0"/>
+                    </a:p>
+                  </a:txBody>
+                  <a:tcPr/>
+                </a:tc>
+                <a:tc vMerge="1">
+                  <a:txBody>
+                    <a:bodyPr/>
+                    <a:lstStyle/>
+                    <a:p>
+                      <a:endParaRPr lang="en-US" dirty="0"/>
+                    </a:p>
+                  </a:txBody>
+                  <a:tcPr/>
+                </a:tc>
+                <a:extLst>
+                  <a:ext uri="{0D108BD9-81ED-4DB2-BD59-A6C34878D82A}">
+                    <a16:rowId xmlns:a16="http://schemas.microsoft.com/office/drawing/2014/main" val="2813143950"/>
+                  </a:ext>
+                </a:extLst>
+              </a:tr>
+              <a:tr h="370840">
+                <a:tc>
+                  <a:txBody>
+                    <a:bodyPr/>
+                    <a:lstStyle/>
+                    <a:p>
+                      <a:r>
+                        <a:rPr lang="en-US" dirty="0"/>
+                        <a:t>Validator App Data</a:t>
+                      </a:r>
+                    </a:p>
+                  </a:txBody>
+                  <a:tcPr/>
+                </a:tc>
+                <a:tc>
+                  <a:txBody>
+                    <a:bodyPr/>
+                    <a:lstStyle/>
+                    <a:p>
+                      <a:r>
+                        <a:rPr lang="en-US" dirty="0"/>
+                        <a:t>Validators App Data</a:t>
+                      </a:r>
+                    </a:p>
+                  </a:txBody>
+                  <a:tcPr/>
+                </a:tc>
+                <a:tc rowSpan="2">
+                  <a:txBody>
+                    <a:bodyPr/>
+                    <a:lstStyle/>
+                    <a:p>
+                      <a:r>
+                        <a:rPr lang="en-US" dirty="0"/>
+                        <a:t>A </a:t>
+                      </a:r>
+                      <a:r>
+                        <a:rPr lang="en-US" dirty="0" err="1"/>
+                        <a:t>vote_pubkey</a:t>
+                      </a:r>
+                      <a:r>
+                        <a:rPr lang="en-US" dirty="0"/>
+                        <a:t> aligns to a </a:t>
+                      </a:r>
+                      <a:r>
+                        <a:rPr lang="en-US" dirty="0" err="1"/>
+                        <a:t>node_pubkey</a:t>
+                      </a:r>
+                      <a:r>
+                        <a:rPr lang="en-US" dirty="0"/>
+                        <a:t> which operates from a location, running a software version, etc.</a:t>
+                      </a:r>
+                    </a:p>
+                  </a:txBody>
+                  <a:tcPr/>
+                </a:tc>
+                <a:extLst>
+                  <a:ext uri="{0D108BD9-81ED-4DB2-BD59-A6C34878D82A}">
+                    <a16:rowId xmlns:a16="http://schemas.microsoft.com/office/drawing/2014/main" val="653346176"/>
+                  </a:ext>
+                </a:extLst>
+              </a:tr>
+              <a:tr h="370840">
+                <a:tc>
+                  <a:txBody>
+                    <a:bodyPr/>
+                    <a:lstStyle/>
+                    <a:p>
+                      <a:endParaRPr lang="en-US" dirty="0"/>
+                    </a:p>
+                  </a:txBody>
+                  <a:tcPr/>
+                </a:tc>
+                <a:tc>
+                  <a:txBody>
+                    <a:bodyPr/>
+                    <a:lstStyle/>
+                    <a:p>
+                      <a:endParaRPr lang="en-US" dirty="0"/>
+                    </a:p>
+                  </a:txBody>
+                  <a:tcPr/>
+                </a:tc>
+                <a:tc vMerge="1">
+                  <a:txBody>
+                    <a:bodyPr/>
+                    <a:lstStyle/>
+                    <a:p>
+                      <a:endParaRPr lang="en-US" dirty="0"/>
+                    </a:p>
+                  </a:txBody>
+                  <a:tcPr/>
+                </a:tc>
+                <a:extLst>
+                  <a:ext uri="{0D108BD9-81ED-4DB2-BD59-A6C34878D82A}">
+                    <a16:rowId xmlns:a16="http://schemas.microsoft.com/office/drawing/2014/main" val="3562130565"/>
+                  </a:ext>
+                </a:extLst>
+              </a:tr>
+            </a:tbl>
+          </a:graphicData>
+        </a:graphic>
+      </p:graphicFrame>
+    </p:spTree>
+    <p:extLst>
+      <p:ext uri="{BB962C8B-B14F-4D97-AF65-F5344CB8AC3E}">
+        <p14:creationId xmlns:p14="http://schemas.microsoft.com/office/powerpoint/2010/main" val="4282249549"/>
+      </p:ext>
+    </p:extLst>
+  </p:cSld>
+  <p:clrMapOvr>
+    <a:masterClrMapping/>
+  </p:clrMapOvr>
+</p:sld>
+</file>
+
+<file path=ppt/slides/slide19.xml><?xml version="1.0" encoding="utf-8"?>
+<p:sld xmlns:a="http://schemas.openxmlformats.org/drawingml/2006/main" xmlns:r="http://schemas.openxmlformats.org/officeDocument/2006/relationships" xmlns:p="http://schemas.openxmlformats.org/presentationml/2006/main">
+  <p:cSld>
+    <p:spTree>
+      <p:nvGrpSpPr>
+        <p:cNvPr id="1" name=""/>
+        <p:cNvGrpSpPr/>
+        <p:nvPr/>
+      </p:nvGrpSpPr>
+      <p:grpSpPr>
+        <a:xfrm>
+          <a:off x="0" y="0"/>
+          <a:ext cx="0" cy="0"/>
+          <a:chOff x="0" y="0"/>
+          <a:chExt cx="0" cy="0"/>
+        </a:xfrm>
+      </p:grpSpPr>
+      <p:pic>
+        <p:nvPicPr>
+          <p:cNvPr id="2" name="Picture 1">
+            <a:extLst>
+              <a:ext uri="{FF2B5EF4-FFF2-40B4-BE49-F238E27FC236}">
+                <a16:creationId xmlns:a16="http://schemas.microsoft.com/office/drawing/2014/main" id="{445D8986-A197-A09A-F1C9-81953F795925}"/>
+              </a:ext>
+            </a:extLst>
+          </p:cNvPr>
+          <p:cNvPicPr>
+            <a:picLocks noChangeAspect="1"/>
+          </p:cNvPicPr>
+          <p:nvPr/>
+        </p:nvPicPr>
+        <p:blipFill>
+          <a:blip r:embed="rId2"/>
+          <a:stretch>
+            <a:fillRect/>
+          </a:stretch>
+        </p:blipFill>
+        <p:spPr>
+          <a:xfrm>
+            <a:off x="0" y="2250359"/>
+            <a:ext cx="8637229" cy="3937773"/>
+          </a:xfrm>
+          <a:prstGeom prst="rect">
+            <a:avLst/>
+          </a:prstGeom>
+        </p:spPr>
+      </p:pic>
+      <p:pic>
+        <p:nvPicPr>
+          <p:cNvPr id="3" name="Picture 2">
+            <a:extLst>
+              <a:ext uri="{FF2B5EF4-FFF2-40B4-BE49-F238E27FC236}">
+                <a16:creationId xmlns:a16="http://schemas.microsoft.com/office/drawing/2014/main" id="{22805F4B-414F-CCDC-06F9-FBE5B4E7BF4A}"/>
+              </a:ext>
+            </a:extLst>
+          </p:cNvPr>
+          <p:cNvPicPr>
+            <a:picLocks noChangeAspect="1"/>
+          </p:cNvPicPr>
+          <p:nvPr/>
+        </p:nvPicPr>
+        <p:blipFill>
+          <a:blip r:embed="rId3"/>
+          <a:stretch>
+            <a:fillRect/>
+          </a:stretch>
+        </p:blipFill>
+        <p:spPr>
+          <a:xfrm>
+            <a:off x="7515324" y="1836794"/>
+            <a:ext cx="3117474" cy="4351338"/>
+          </a:xfrm>
+          <a:prstGeom prst="rect">
+            <a:avLst/>
+          </a:prstGeom>
+        </p:spPr>
+      </p:pic>
+      <p:sp>
+        <p:nvSpPr>
+          <p:cNvPr id="4" name="TextBox 3">
+            <a:extLst>
+              <a:ext uri="{FF2B5EF4-FFF2-40B4-BE49-F238E27FC236}">
+                <a16:creationId xmlns:a16="http://schemas.microsoft.com/office/drawing/2014/main" id="{8D19333D-9944-8022-E682-9FD1A8C8E0B9}"/>
+              </a:ext>
+            </a:extLst>
+          </p:cNvPr>
+          <p:cNvSpPr txBox="1"/>
+          <p:nvPr/>
+        </p:nvSpPr>
+        <p:spPr>
+          <a:xfrm>
+            <a:off x="394283" y="335560"/>
+            <a:ext cx="2094420" cy="369332"/>
+          </a:xfrm>
+          <a:prstGeom prst="rect">
+            <a:avLst/>
+          </a:prstGeom>
+          <a:noFill/>
+        </p:spPr>
+        <p:txBody>
+          <a:bodyPr wrap="none" rtlCol="0">
+            <a:spAutoFit/>
+          </a:bodyPr>
+          <a:lstStyle/>
+          <a:p>
+            <a:r>
+              <a:rPr lang="en-US" dirty="0"/>
+              <a:t>What is Delinquent?</a:t>
+            </a:r>
+          </a:p>
+        </p:txBody>
+      </p:sp>
+    </p:spTree>
+    <p:extLst>
+      <p:ext uri="{BB962C8B-B14F-4D97-AF65-F5344CB8AC3E}">
+        <p14:creationId xmlns:p14="http://schemas.microsoft.com/office/powerpoint/2010/main" val="261509142"/>
+      </p:ext>
+    </p:extLst>
+  </p:cSld>
+  <p:clrMapOvr>
+    <a:masterClrMapping/>
+  </p:clrMapOvr>
+</p:sld>
+</file>
+
 <file path=ppt/slides/slide2.xml><?xml version="1.0" encoding="utf-8"?>
 <p:sld xmlns:a="http://schemas.openxmlformats.org/drawingml/2006/main" xmlns:r="http://schemas.openxmlformats.org/officeDocument/2006/relationships" xmlns:p="http://schemas.openxmlformats.org/presentationml/2006/main">
   <p:cSld>
@@ -6216,6 +6789,107 @@
     <p:extLst>
       <p:ext uri="{BB962C8B-B14F-4D97-AF65-F5344CB8AC3E}">
         <p14:creationId xmlns:p14="http://schemas.microsoft.com/office/powerpoint/2010/main" val="1679198776"/>
+      </p:ext>
+    </p:extLst>
+  </p:cSld>
+  <p:clrMapOvr>
+    <a:masterClrMapping/>
+  </p:clrMapOvr>
+</p:sld>
+</file>
+
+<file path=ppt/slides/slide20.xml><?xml version="1.0" encoding="utf-8"?>
+<p:sld xmlns:a="http://schemas.openxmlformats.org/drawingml/2006/main" xmlns:r="http://schemas.openxmlformats.org/officeDocument/2006/relationships" xmlns:p="http://schemas.openxmlformats.org/presentationml/2006/main">
+  <p:cSld>
+    <p:spTree>
+      <p:nvGrpSpPr>
+        <p:cNvPr id="1" name=""/>
+        <p:cNvGrpSpPr/>
+        <p:nvPr/>
+      </p:nvGrpSpPr>
+      <p:grpSpPr>
+        <a:xfrm>
+          <a:off x="0" y="0"/>
+          <a:ext cx="0" cy="0"/>
+          <a:chOff x="0" y="0"/>
+          <a:chExt cx="0" cy="0"/>
+        </a:xfrm>
+      </p:grpSpPr>
+      <p:sp>
+        <p:nvSpPr>
+          <p:cNvPr id="4" name="TextBox 3">
+            <a:extLst>
+              <a:ext uri="{FF2B5EF4-FFF2-40B4-BE49-F238E27FC236}">
+                <a16:creationId xmlns:a16="http://schemas.microsoft.com/office/drawing/2014/main" id="{8D19333D-9944-8022-E682-9FD1A8C8E0B9}"/>
+              </a:ext>
+            </a:extLst>
+          </p:cNvPr>
+          <p:cNvSpPr txBox="1"/>
+          <p:nvPr/>
+        </p:nvSpPr>
+        <p:spPr>
+          <a:xfrm>
+            <a:off x="394283" y="335560"/>
+            <a:ext cx="6677918" cy="646331"/>
+          </a:xfrm>
+          <a:prstGeom prst="rect">
+            <a:avLst/>
+          </a:prstGeom>
+          <a:noFill/>
+        </p:spPr>
+        <p:txBody>
+          <a:bodyPr wrap="none" rtlCol="0">
+            <a:spAutoFit/>
+          </a:bodyPr>
+          <a:lstStyle/>
+          <a:p>
+            <a:r>
+              <a:rPr lang="en-US" dirty="0"/>
+              <a:t>How are scores derived?</a:t>
+            </a:r>
+          </a:p>
+          <a:p>
+            <a:r>
+              <a:rPr lang="en-US" dirty="0"/>
+              <a:t>Which are fastest highest value changes voters can make to improve?</a:t>
+            </a:r>
+          </a:p>
+        </p:txBody>
+      </p:sp>
+      <p:pic>
+        <p:nvPicPr>
+          <p:cNvPr id="6" name="Picture 5">
+            <a:extLst>
+              <a:ext uri="{FF2B5EF4-FFF2-40B4-BE49-F238E27FC236}">
+                <a16:creationId xmlns:a16="http://schemas.microsoft.com/office/drawing/2014/main" id="{8D62B62C-9D4E-7141-896A-B9C6A267B9C3}"/>
+              </a:ext>
+            </a:extLst>
+          </p:cNvPr>
+          <p:cNvPicPr>
+            <a:picLocks noChangeAspect="1"/>
+          </p:cNvPicPr>
+          <p:nvPr/>
+        </p:nvPicPr>
+        <p:blipFill>
+          <a:blip r:embed="rId2"/>
+          <a:stretch>
+            <a:fillRect/>
+          </a:stretch>
+        </p:blipFill>
+        <p:spPr>
+          <a:xfrm>
+            <a:off x="0" y="1753268"/>
+            <a:ext cx="12192000" cy="4240696"/>
+          </a:xfrm>
+          <a:prstGeom prst="rect">
+            <a:avLst/>
+          </a:prstGeom>
+        </p:spPr>
+      </p:pic>
+    </p:spTree>
+    <p:extLst>
+      <p:ext uri="{BB962C8B-B14F-4D97-AF65-F5344CB8AC3E}">
+        <p14:creationId xmlns:p14="http://schemas.microsoft.com/office/powerpoint/2010/main" val="984524437"/>
       </p:ext>
     </p:extLst>
   </p:cSld>
@@ -8996,7 +9670,15 @@
           <a:p>
             <a:r>
               <a:rPr lang="en-US" dirty="0"/>
-              <a:t>Example “Simple” Validator at Epoch 431</a:t>
+              <a:t>Example “Simple” </a:t>
+            </a:r>
+            <a:r>
+              <a:rPr lang="en-US" dirty="0" err="1"/>
+              <a:t>Staker</a:t>
+            </a:r>
+            <a:r>
+              <a:rPr lang="en-US" dirty="0"/>
+              <a:t> at Epoch 431</a:t>
             </a:r>
           </a:p>
         </p:txBody>
@@ -9348,8 +10030,13 @@
           <a:p>
             <a:r>
               <a:rPr lang="en-US" dirty="0"/>
-              <a:t>Example “Simple” Validator</a:t>
-            </a:r>
+              <a:t>Example “Simple” </a:t>
+            </a:r>
+            <a:r>
+              <a:rPr lang="en-US" dirty="0" err="1"/>
+              <a:t>Staker</a:t>
+            </a:r>
+            <a:endParaRPr lang="en-US" dirty="0"/>
           </a:p>
         </p:txBody>
       </p:sp>
@@ -9395,7 +10082,7 @@
                   <a:srgbClr val="0070C0"/>
                 </a:solidFill>
               </a:rPr>
-              <a:t>Q for Sol experts – this </a:t>
+              <a:t>Q– this </a:t>
             </a:r>
             <a:r>
               <a:rPr lang="en-US" sz="2000" dirty="0" err="1">
@@ -9422,7 +10109,7 @@
                   <a:srgbClr val="0070C0"/>
                 </a:solidFill>
               </a:rPr>
-              <a:t>Does data simply not include rent payments &amp; rent-payer (authorized withdrawer?</a:t>
+              <a:t>Does data simply not include rent payments &amp; rent-payer (authorized withdrawer)?</a:t>
             </a:r>
           </a:p>
         </p:txBody>
@@ -9547,8 +10234,13 @@
           <a:p>
             <a:r>
               <a:rPr lang="en-US" dirty="0"/>
-              <a:t>Example “Simple” Validator</a:t>
-            </a:r>
+              <a:t>Example “Simple” </a:t>
+            </a:r>
+            <a:r>
+              <a:rPr lang="en-US" dirty="0" err="1"/>
+              <a:t>Staker</a:t>
+            </a:r>
+            <a:endParaRPr lang="en-US" dirty="0"/>
           </a:p>
         </p:txBody>
       </p:sp>

</xml_diff>